<commit_message>
Changes to pt_pop20, to "episodedate", and more hardcoding
</commit_message>
<xml_diff>
--- a/src/template.pptx
+++ b/src/template.pptx
@@ -211,7 +211,7 @@
           </a:lstStyle>
           <a:p>
             <a:fld id="{B566DE57-8385-0247-BEC0-99249BF238FA}" type="datetimeFigureOut">
-              <a:t>9/23/2020</a:t>
+              <a:t>1/29/2021</a:t>
             </a:fld>
             <a:endParaRPr lang="en-US"/>
           </a:p>
@@ -375,7 +375,7 @@
           </a:lstStyle>
           <a:p>
             <a:fld id="{33B11632-AF48-FC4B-A082-8C387D3BE013}" type="datetimeFigureOut">
-              <a:t>9/23/2020</a:t>
+              <a:t>1/29/2021</a:t>
             </a:fld>
             <a:endParaRPr lang="en-US"/>
           </a:p>
@@ -4543,12 +4543,12 @@
       </p:sp>
       <p:sp>
         <p:nvSpPr>
-          <p:cNvPr id="4" name="Slide Number Placeholder 3"/>
-          <p:cNvSpPr>
-            <a:spLocks noGrp="1"/>
-          </p:cNvSpPr>
-          <p:nvPr>
-            <p:ph type="sldNum" sz="quarter" idx="12"/>
+          <p:cNvPr id="5" name="Text Placeholder 4"/>
+          <p:cNvSpPr>
+            <a:spLocks noGrp="1"/>
+          </p:cNvSpPr>
+          <p:nvPr>
+            <p:ph type="body" sz="quarter" idx="13"/>
           </p:nvPr>
         </p:nvSpPr>
         <p:spPr/>
@@ -4556,30 +4556,45 @@
           <a:bodyPr/>
           <a:lstStyle/>
           <a:p>
-            <a:fld id="{5E40D50F-0626-7A4B-A742-09CCAA5CF4F6}" type="slidenum">
-              <a:rPr lang="en-US"/>
+            <a:endParaRPr lang="en-US"/>
+          </a:p>
+        </p:txBody>
+      </p:sp>
+      <p:sp>
+        <p:nvSpPr>
+          <p:cNvPr id="4" name="TextBox 3"/>
+          <p:cNvSpPr txBox="1"/>
+          <p:nvPr/>
+        </p:nvSpPr>
+        <p:spPr>
+          <a:xfrm flipH="1">
+            <a:off x="11270769" y="6467647"/>
+            <a:ext cx="414183" cy="369332"/>
+          </a:xfrm>
+          <a:prstGeom prst="rect">
+            <a:avLst/>
+          </a:prstGeom>
+          <a:noFill/>
+        </p:spPr>
+        <p:txBody>
+          <a:bodyPr wrap="square" rtlCol="0">
+            <a:spAutoFit/>
+          </a:bodyPr>
+          <a:lstStyle/>
+          <a:p>
+            <a:fld id="{6F6946D3-7091-4C95-82D4-537B0D07D283}" type="slidenum">
+              <a:rPr lang="en-CA" smtClean="0">
+                <a:solidFill>
+                  <a:schemeClr val="bg1"/>
+                </a:solidFill>
+              </a:rPr>
               <a:t>2</a:t>
             </a:fld>
-            <a:endParaRPr lang="en-US"/>
-          </a:p>
-        </p:txBody>
-      </p:sp>
-      <p:sp>
-        <p:nvSpPr>
-          <p:cNvPr id="5" name="Text Placeholder 4"/>
-          <p:cNvSpPr>
-            <a:spLocks noGrp="1"/>
-          </p:cNvSpPr>
-          <p:nvPr>
-            <p:ph type="body" sz="quarter" idx="13"/>
-          </p:nvPr>
-        </p:nvSpPr>
-        <p:spPr/>
-        <p:txBody>
-          <a:bodyPr/>
-          <a:lstStyle/>
-          <a:p>
-            <a:endParaRPr lang="en-US"/>
+            <a:endParaRPr lang="en-CA" dirty="0">
+              <a:solidFill>
+                <a:schemeClr val="bg1"/>
+              </a:solidFill>
+            </a:endParaRPr>
           </a:p>
         </p:txBody>
       </p:sp>

</xml_diff>

<commit_message>
Adding slide numbers, bolding titles, and more helper functions
</commit_message>
<xml_diff>
--- a/src/template.pptx
+++ b/src/template.pptx
@@ -211,7 +211,7 @@
           </a:lstStyle>
           <a:p>
             <a:fld id="{B566DE57-8385-0247-BEC0-99249BF238FA}" type="datetimeFigureOut">
-              <a:t>1/29/2021</a:t>
+              <a:t>2/7/2021</a:t>
             </a:fld>
             <a:endParaRPr lang="en-US"/>
           </a:p>
@@ -375,7 +375,7 @@
           </a:lstStyle>
           <a:p>
             <a:fld id="{33B11632-AF48-FC4B-A082-8C387D3BE013}" type="datetimeFigureOut">
-              <a:t>1/29/2021</a:t>
+              <a:t>2/7/2021</a:t>
             </a:fld>
             <a:endParaRPr lang="en-US"/>
           </a:p>
@@ -1540,28 +1540,6 @@
       </p:sp>
       <p:sp>
         <p:nvSpPr>
-          <p:cNvPr id="6" name="Slide Number Placeholder 5"/>
-          <p:cNvSpPr>
-            <a:spLocks noGrp="1"/>
-          </p:cNvSpPr>
-          <p:nvPr>
-            <p:ph type="sldNum" sz="quarter" idx="12"/>
-          </p:nvPr>
-        </p:nvSpPr>
-        <p:spPr/>
-        <p:txBody>
-          <a:bodyPr/>
-          <a:lstStyle/>
-          <a:p>
-            <a:fld id="{5E40D50F-0626-7A4B-A742-09CCAA5CF4F6}" type="slidenum">
-              <a:t>‹#›</a:t>
-            </a:fld>
-            <a:endParaRPr lang="en-US"/>
-          </a:p>
-        </p:txBody>
-      </p:sp>
-      <p:sp>
-        <p:nvSpPr>
           <p:cNvPr id="7" name="TextBox 6"/>
           <p:cNvSpPr txBox="1"/>
           <p:nvPr userDrawn="1"/>
@@ -1623,6 +1601,44 @@
               <a:t>Click to edit text</a:t>
             </a:r>
             <a:endParaRPr lang="en-US"/>
+          </a:p>
+        </p:txBody>
+      </p:sp>
+      <p:sp>
+        <p:nvSpPr>
+          <p:cNvPr id="9" name="TextBox 8"/>
+          <p:cNvSpPr txBox="1"/>
+          <p:nvPr userDrawn="1"/>
+        </p:nvSpPr>
+        <p:spPr>
+          <a:xfrm>
+            <a:off x="11352072" y="6503771"/>
+            <a:ext cx="372218" cy="276999"/>
+          </a:xfrm>
+          <a:prstGeom prst="rect">
+            <a:avLst/>
+          </a:prstGeom>
+          <a:noFill/>
+        </p:spPr>
+        <p:txBody>
+          <a:bodyPr wrap="none" rtlCol="0">
+            <a:spAutoFit/>
+          </a:bodyPr>
+          <a:lstStyle/>
+          <a:p>
+            <a:fld id="{E137FF19-2A38-444F-A227-0C960B8A40A8}" type="slidenum">
+              <a:rPr lang="en-CA" sz="1200" smtClean="0">
+                <a:solidFill>
+                  <a:schemeClr val="bg1"/>
+                </a:solidFill>
+              </a:rPr>
+              <a:t>‹#›</a:t>
+            </a:fld>
+            <a:endParaRPr lang="en-CA" sz="1200" dirty="0">
+              <a:solidFill>
+                <a:schemeClr val="bg1"/>
+              </a:solidFill>
+            </a:endParaRPr>
           </a:p>
         </p:txBody>
       </p:sp>
@@ -1636,6 +1652,7 @@
   <p:clrMapOvr>
     <a:masterClrMapping/>
   </p:clrMapOvr>
+  <p:hf hdr="0" ftr="0" dt="0"/>
 </p:sldLayout>
 </file>
 

</xml_diff>

<commit_message>
Added dynamic summary bullets based on day of week
supports #12
</commit_message>
<xml_diff>
--- a/src/template.pptx
+++ b/src/template.pptx
@@ -211,7 +211,7 @@
           </a:lstStyle>
           <a:p>
             <a:fld id="{B566DE57-8385-0247-BEC0-99249BF238FA}" type="datetimeFigureOut">
-              <a:t>2/7/2021</a:t>
+              <a:t>3/3/2021</a:t>
             </a:fld>
             <a:endParaRPr lang="en-US"/>
           </a:p>
@@ -375,7 +375,7 @@
           </a:lstStyle>
           <a:p>
             <a:fld id="{33B11632-AF48-FC4B-A082-8C387D3BE013}" type="datetimeFigureOut">
-              <a:t>2/7/2021</a:t>
+              <a:t>3/3/2021</a:t>
             </a:fld>
             <a:endParaRPr lang="en-US"/>
           </a:p>
@@ -1449,38 +1449,38 @@
           <a:p>
             <a:pPr lvl="0"/>
             <a:r>
-              <a:rPr lang="en-US" smtClean="0"/>
+              <a:rPr lang="en-US" dirty="0" smtClean="0"/>
               <a:t>Click to edit Master text styles</a:t>
             </a:r>
           </a:p>
           <a:p>
             <a:pPr lvl="1"/>
             <a:r>
-              <a:rPr lang="en-US" smtClean="0"/>
+              <a:rPr lang="en-US" dirty="0" smtClean="0"/>
               <a:t>Second level</a:t>
             </a:r>
           </a:p>
           <a:p>
             <a:pPr lvl="2"/>
             <a:r>
-              <a:rPr lang="en-US" smtClean="0"/>
+              <a:rPr lang="en-US" dirty="0" smtClean="0"/>
               <a:t>Third level</a:t>
             </a:r>
           </a:p>
           <a:p>
             <a:pPr lvl="3"/>
             <a:r>
-              <a:rPr lang="en-US" smtClean="0"/>
+              <a:rPr lang="en-US" dirty="0" smtClean="0"/>
               <a:t>Fourth level</a:t>
             </a:r>
           </a:p>
           <a:p>
             <a:pPr lvl="4"/>
             <a:r>
-              <a:rPr lang="en-US" smtClean="0"/>
+              <a:rPr lang="en-US" dirty="0" smtClean="0"/>
               <a:t>Fifth level</a:t>
             </a:r>
-            <a:endParaRPr lang="en-US"/>
+            <a:endParaRPr lang="en-US" dirty="0"/>
           </a:p>
         </p:txBody>
       </p:sp>
@@ -4028,35 +4028,35 @@
           <a:p>
             <a:pPr lvl="0"/>
             <a:r>
-              <a:rPr lang="en-US" smtClean="0"/>
+              <a:rPr lang="en-US" dirty="0" smtClean="0"/>
               <a:t>Click to edit Master text styles</a:t>
             </a:r>
           </a:p>
           <a:p>
             <a:pPr lvl="1"/>
             <a:r>
-              <a:rPr lang="en-US" smtClean="0"/>
+              <a:rPr lang="en-US" dirty="0" smtClean="0"/>
               <a:t>Second level</a:t>
             </a:r>
           </a:p>
           <a:p>
             <a:pPr lvl="2"/>
             <a:r>
-              <a:rPr lang="en-US" smtClean="0"/>
+              <a:rPr lang="en-US" dirty="0" smtClean="0"/>
               <a:t>Third level</a:t>
             </a:r>
           </a:p>
           <a:p>
             <a:pPr lvl="3"/>
             <a:r>
-              <a:rPr lang="en-US" smtClean="0"/>
+              <a:rPr lang="en-US" dirty="0" smtClean="0"/>
               <a:t>Fourth level</a:t>
             </a:r>
           </a:p>
           <a:p>
             <a:pPr lvl="4"/>
             <a:r>
-              <a:rPr lang="en-US" smtClean="0"/>
+              <a:rPr lang="en-US" dirty="0" smtClean="0"/>
               <a:t>Fifth level</a:t>
             </a:r>
             <a:endParaRPr lang="en-US" dirty="0"/>
@@ -4152,7 +4152,7 @@
     <p:bodyStyle>
       <a:lvl1pPr marL="342900" indent="-342900" algn="l" defTabSz="457200" rtl="0" eaLnBrk="1" latinLnBrk="0" hangingPunct="1">
         <a:spcBef>
-          <a:spcPct val="20000"/>
+          <a:spcPts val="0"/>
         </a:spcBef>
         <a:buFont typeface="Arial"/>
         <a:buChar char="•"/>

</xml_diff>

<commit_message>
New R alternatives to python-based graphs
Not in production yet, but soon
</commit_message>
<xml_diff>
--- a/src/template.pptx
+++ b/src/template.pptx
@@ -211,7 +211,7 @@
           </a:lstStyle>
           <a:p>
             <a:fld id="{B566DE57-8385-0247-BEC0-99249BF238FA}" type="datetimeFigureOut">
-              <a:t>3/3/2021</a:t>
+              <a:t>3/8/2021</a:t>
             </a:fld>
             <a:endParaRPr lang="en-US"/>
           </a:p>
@@ -375,7 +375,7 @@
           </a:lstStyle>
           <a:p>
             <a:fld id="{33B11632-AF48-FC4B-A082-8C387D3BE013}" type="datetimeFigureOut">
-              <a:t>3/3/2021</a:t>
+              <a:t>3/8/2021</a:t>
             </a:fld>
             <a:endParaRPr lang="en-US"/>
           </a:p>
@@ -857,6 +857,13 @@
   <p:clrMapOvr>
     <a:masterClrMapping/>
   </p:clrMapOvr>
+  <p:timing>
+    <p:tnLst>
+      <p:par>
+        <p:cTn id="1" dur="indefinite" restart="never" nodeType="tmRoot"/>
+      </p:par>
+    </p:tnLst>
+  </p:timing>
 </p:sldLayout>
 </file>
 
@@ -1109,6 +1116,13 @@
   <p:clrMapOvr>
     <a:masterClrMapping/>
   </p:clrMapOvr>
+  <p:timing>
+    <p:tnLst>
+      <p:par>
+        <p:cTn id="1" dur="indefinite" restart="never" nodeType="tmRoot"/>
+      </p:par>
+    </p:tnLst>
+  </p:timing>
 </p:sldLayout>
 </file>
 
@@ -1366,6 +1380,13 @@
   <p:clrMapOvr>
     <a:masterClrMapping/>
   </p:clrMapOvr>
+  <p:timing>
+    <p:tnLst>
+      <p:par>
+        <p:cTn id="1" dur="indefinite" restart="never" nodeType="tmRoot"/>
+      </p:par>
+    </p:tnLst>
+  </p:timing>
 </p:sldLayout>
 </file>
 
@@ -1652,6 +1673,13 @@
   <p:clrMapOvr>
     <a:masterClrMapping/>
   </p:clrMapOvr>
+  <p:timing>
+    <p:tnLst>
+      <p:par>
+        <p:cTn id="1" dur="indefinite" restart="never" nodeType="tmRoot"/>
+      </p:par>
+    </p:tnLst>
+  </p:timing>
   <p:hf hdr="0" ftr="0" dt="0"/>
 </p:sldLayout>
 </file>
@@ -2346,6 +2374,13 @@
   <p:clrMapOvr>
     <a:masterClrMapping/>
   </p:clrMapOvr>
+  <p:timing>
+    <p:tnLst>
+      <p:par>
+        <p:cTn id="1" dur="indefinite" restart="never" nodeType="tmRoot"/>
+      </p:par>
+    </p:tnLst>
+  </p:timing>
 </p:sldLayout>
 </file>
 
@@ -2854,6 +2889,13 @@
   <p:clrMapOvr>
     <a:masterClrMapping/>
   </p:clrMapOvr>
+  <p:timing>
+    <p:tnLst>
+      <p:par>
+        <p:cTn id="1" dur="indefinite" restart="never" nodeType="tmRoot"/>
+      </p:par>
+    </p:tnLst>
+  </p:timing>
 </p:sldLayout>
 </file>
 
@@ -3054,6 +3096,13 @@
   <p:clrMapOvr>
     <a:masterClrMapping/>
   </p:clrMapOvr>
+  <p:timing>
+    <p:tnLst>
+      <p:par>
+        <p:cTn id="1" dur="indefinite" restart="never" nodeType="tmRoot"/>
+      </p:par>
+    </p:tnLst>
+  </p:timing>
 </p:sldLayout>
 </file>
 
@@ -3226,6 +3275,13 @@
   <p:clrMapOvr>
     <a:masterClrMapping/>
   </p:clrMapOvr>
+  <p:timing>
+    <p:tnLst>
+      <p:par>
+        <p:cTn id="1" dur="indefinite" restart="never" nodeType="tmRoot"/>
+      </p:par>
+    </p:tnLst>
+  </p:timing>
 </p:sldLayout>
 </file>
 
@@ -3580,6 +3636,13 @@
   <p:clrMapOvr>
     <a:masterClrMapping/>
   </p:clrMapOvr>
+  <p:timing>
+    <p:tnLst>
+      <p:par>
+        <p:cTn id="1" dur="indefinite" restart="never" nodeType="tmRoot"/>
+      </p:par>
+    </p:tnLst>
+  </p:timing>
 </p:sldLayout>
 </file>
 
@@ -3810,7 +3873,11 @@
         </p:spPr>
         <p:txBody>
           <a:bodyPr/>
-          <a:lstStyle/>
+          <a:lstStyle>
+            <a:lvl1pPr>
+              <a:defRPr sz="1200"/>
+            </a:lvl1pPr>
+          </a:lstStyle>
           <a:p>
             <a:endParaRPr lang="en-US"/>
           </a:p>
@@ -3914,6 +3981,13 @@
   <p:clrMapOvr>
     <a:masterClrMapping/>
   </p:clrMapOvr>
+  <p:timing>
+    <p:tnLst>
+      <p:par>
+        <p:cTn id="1" dur="indefinite" restart="never" nodeType="tmRoot"/>
+      </p:par>
+    </p:tnLst>
+  </p:timing>
 </p:sldLayout>
 </file>
 
@@ -4158,10 +4232,7 @@
         <a:buChar char="•"/>
         <a:defRPr sz="1800" kern="1200">
           <a:solidFill>
-            <a:schemeClr val="tx1">
-              <a:lumMod val="75000"/>
-              <a:lumOff val="25000"/>
-            </a:schemeClr>
+            <a:schemeClr val="tx1"/>
           </a:solidFill>
           <a:latin typeface="+mn-lt"/>
           <a:ea typeface="+mn-ea"/>
@@ -4176,10 +4247,7 @@
         <a:buChar char="–"/>
         <a:defRPr sz="1600" kern="1200">
           <a:solidFill>
-            <a:schemeClr val="tx1">
-              <a:lumMod val="75000"/>
-              <a:lumOff val="25000"/>
-            </a:schemeClr>
+            <a:schemeClr val="tx1"/>
           </a:solidFill>
           <a:latin typeface="+mn-lt"/>
           <a:ea typeface="+mn-ea"/>
@@ -4194,10 +4262,7 @@
         <a:buChar char="•"/>
         <a:defRPr sz="1400" kern="1200">
           <a:solidFill>
-            <a:schemeClr val="tx1">
-              <a:lumMod val="75000"/>
-              <a:lumOff val="25000"/>
-            </a:schemeClr>
+            <a:schemeClr val="tx1"/>
           </a:solidFill>
           <a:latin typeface="+mn-lt"/>
           <a:ea typeface="+mn-ea"/>
@@ -4212,10 +4277,7 @@
         <a:buChar char="–"/>
         <a:defRPr sz="1200" kern="1200">
           <a:solidFill>
-            <a:schemeClr val="tx1">
-              <a:lumMod val="75000"/>
-              <a:lumOff val="25000"/>
-            </a:schemeClr>
+            <a:schemeClr val="tx1"/>
           </a:solidFill>
           <a:latin typeface="+mn-lt"/>
           <a:ea typeface="+mn-ea"/>
@@ -4230,10 +4292,7 @@
         <a:buChar char="»"/>
         <a:defRPr sz="1200" kern="1200">
           <a:solidFill>
-            <a:schemeClr val="tx1">
-              <a:lumMod val="75000"/>
-              <a:lumOff val="25000"/>
-            </a:schemeClr>
+            <a:schemeClr val="tx1"/>
           </a:solidFill>
           <a:latin typeface="+mn-lt"/>
           <a:ea typeface="+mn-ea"/>

</xml_diff>